<commit_message>
add pdf version just in case
</commit_message>
<xml_diff>
--- a/presentation.pptx
+++ b/presentation.pptx
@@ -204,7 +204,7 @@
           <a:bodyPr lIns="0" rIns="0" tIns="0" bIns="0" anchor="b"/>
           <a:p>
             <a:pPr algn="r"/>
-            <a:fld id="{5CE1D5B9-12B8-43D8-8F5B-4E10D309D7DC}" type="slidenum">
+            <a:fld id="{BE7C37AE-A784-49D5-90FC-94AC019EDA12}" type="slidenum">
               <a:rPr lang="en-US" sz="1400">
                 <a:latin typeface="Times New Roman"/>
               </a:rPr>
@@ -250,7 +250,7 @@
         <p:spPr>
           <a:xfrm>
             <a:off x="777960" y="4778280"/>
-            <a:ext cx="6215760" cy="4525200"/>
+            <a:ext cx="6215400" cy="4524840"/>
           </a:xfrm>
           <a:prstGeom prst="rect">
             <a:avLst/>
@@ -278,7 +278,7 @@
         <p:spPr>
           <a:xfrm>
             <a:off x="4402080" y="9553680"/>
-            <a:ext cx="3367800" cy="502560"/>
+            <a:ext cx="3367440" cy="502200"/>
           </a:xfrm>
           <a:prstGeom prst="rect">
             <a:avLst/>
@@ -5746,7 +5746,7 @@
         <p:spPr>
           <a:xfrm>
             <a:off x="504000" y="301320"/>
-            <a:ext cx="9070200" cy="5850360"/>
+            <a:ext cx="9069840" cy="5850000"/>
           </a:xfrm>
           <a:prstGeom prst="rect">
             <a:avLst/>
@@ -5904,7 +5904,7 @@
         <p:spPr>
           <a:xfrm>
             <a:off x="605520" y="118440"/>
-            <a:ext cx="8865360" cy="1473120"/>
+            <a:ext cx="8865000" cy="1472760"/>
           </a:xfrm>
           <a:prstGeom prst="rect">
             <a:avLst/>
@@ -5934,6 +5934,7 @@
                   <a:srgbClr val="2c7c9f"/>
                 </a:solidFill>
                 <a:latin typeface="News Gothic MT"/>
+                <a:ea typeface="DejaVu Sans"/>
               </a:rPr>
               <a:t>CNN features, continued</a:t>
             </a:r>
@@ -5950,7 +5951,7 @@
         <p:spPr>
           <a:xfrm>
             <a:off x="605520" y="1764000"/>
-            <a:ext cx="8865360" cy="4786920"/>
+            <a:ext cx="8865000" cy="4786560"/>
           </a:xfrm>
           <a:prstGeom prst="rect">
             <a:avLst/>
@@ -5983,8 +5984,20 @@
                   <a:srgbClr val="595959"/>
                 </a:solidFill>
                 <a:latin typeface="News Gothic MT"/>
+                <a:ea typeface="DejaVu Sans"/>
               </a:rPr>
               <a:t>Feature: vector describing “pictorial word”</a:t>
+            </a:r>
+            <a:r>
+              <a:rPr lang="en-US" sz="2600" strike="noStrike">
+                <a:solidFill>
+                  <a:srgbClr val="595959"/>
+                </a:solidFill>
+                <a:latin typeface="News Gothic MT"/>
+                <a:ea typeface="DejaVu Sans"/>
+              </a:rPr>
+              <a:t>
+</a:t>
             </a:r>
             <a:endParaRPr/>
           </a:p>
@@ -6003,6 +6016,7 @@
                   <a:srgbClr val="595959"/>
                 </a:solidFill>
                 <a:latin typeface="News Gothic MT"/>
+                <a:ea typeface="DejaVu Sans"/>
               </a:rPr>
               <a:t>Extract features from layers 10 and 21</a:t>
             </a:r>
@@ -6023,7 +6037,7 @@
         <p:spPr>
           <a:xfrm>
             <a:off x="4647240" y="3044880"/>
-            <a:ext cx="5433120" cy="3599640"/>
+            <a:ext cx="5432760" cy="3599280"/>
           </a:xfrm>
           <a:prstGeom prst="rect">
             <a:avLst/>
@@ -6046,7 +6060,7 @@
         <p:spPr>
           <a:xfrm>
             <a:off x="91440" y="3344400"/>
-            <a:ext cx="4438080" cy="2834280"/>
+            <a:ext cx="4437720" cy="2833920"/>
           </a:xfrm>
           <a:prstGeom prst="rect">
             <a:avLst/>
@@ -6065,7 +6079,7 @@
         <p:spPr>
           <a:xfrm>
             <a:off x="0" y="7194960"/>
-            <a:ext cx="8708400" cy="364320"/>
+            <a:ext cx="8708040" cy="363960"/>
           </a:xfrm>
           <a:prstGeom prst="rect">
             <a:avLst/>
@@ -6161,7 +6175,7 @@
         <p:spPr>
           <a:xfrm>
             <a:off x="605520" y="118440"/>
-            <a:ext cx="8865360" cy="1473120"/>
+            <a:ext cx="8865000" cy="1472760"/>
           </a:xfrm>
           <a:prstGeom prst="rect">
             <a:avLst/>
@@ -6191,6 +6205,7 @@
                   <a:srgbClr val="2c7c9f"/>
                 </a:solidFill>
                 <a:latin typeface="News Gothic MT"/>
+                <a:ea typeface="DejaVu Sans"/>
               </a:rPr>
               <a:t>Confusion Matrices: Malaga Dataset</a:t>
             </a:r>
@@ -6211,7 +6226,7 @@
         <p:spPr>
           <a:xfrm>
             <a:off x="41760" y="2027160"/>
-            <a:ext cx="5198040" cy="4686480"/>
+            <a:ext cx="5197680" cy="4686120"/>
           </a:xfrm>
           <a:prstGeom prst="rect">
             <a:avLst/>
@@ -6234,7 +6249,7 @@
         <p:spPr>
           <a:xfrm>
             <a:off x="4974840" y="2027160"/>
-            <a:ext cx="5146920" cy="4686480"/>
+            <a:ext cx="5146560" cy="4686120"/>
           </a:xfrm>
           <a:prstGeom prst="rect">
             <a:avLst/>
@@ -6302,7 +6317,7 @@
         <p:spPr>
           <a:xfrm>
             <a:off x="605520" y="118440"/>
-            <a:ext cx="8865360" cy="1473120"/>
+            <a:ext cx="8865000" cy="1472760"/>
           </a:xfrm>
           <a:prstGeom prst="rect">
             <a:avLst/>
@@ -6332,6 +6347,7 @@
                   <a:srgbClr val="2c7c9f"/>
                 </a:solidFill>
                 <a:latin typeface="News Gothic MT"/>
+                <a:ea typeface="DejaVu Sans"/>
               </a:rPr>
               <a:t>Confusion Matrices: </a:t>
             </a:r>
@@ -6341,6 +6357,7 @@
                   <a:srgbClr val="2c7c9f"/>
                 </a:solidFill>
                 <a:latin typeface="News Gothic MT"/>
+                <a:ea typeface="DejaVu Sans"/>
               </a:rPr>
               <a:t>clbuucd </a:t>
             </a:r>
@@ -6350,6 +6367,7 @@
                   <a:srgbClr val="2c7c9f"/>
                 </a:solidFill>
                 <a:latin typeface="News Gothic MT"/>
+                <a:ea typeface="DejaVu Sans"/>
               </a:rPr>
               <a:t>Dataset</a:t>
             </a:r>
@@ -6359,6 +6377,7 @@
                   <a:srgbClr val="2c7c9f"/>
                 </a:solidFill>
                 <a:latin typeface="News Gothic MT"/>
+                <a:ea typeface="DejaVu Sans"/>
               </a:rPr>
               <a:t> </a:t>
             </a:r>
@@ -6379,7 +6398,7 @@
         <p:spPr>
           <a:xfrm>
             <a:off x="0" y="2039040"/>
-            <a:ext cx="5030280" cy="4556160"/>
+            <a:ext cx="5029920" cy="4555800"/>
           </a:xfrm>
           <a:prstGeom prst="rect">
             <a:avLst/>
@@ -6402,7 +6421,7 @@
         <p:spPr>
           <a:xfrm>
             <a:off x="4917600" y="2039040"/>
-            <a:ext cx="5186880" cy="4556160"/>
+            <a:ext cx="5186520" cy="4555800"/>
           </a:xfrm>
           <a:prstGeom prst="rect">
             <a:avLst/>
@@ -6470,7 +6489,7 @@
         <p:spPr>
           <a:xfrm>
             <a:off x="605520" y="118440"/>
-            <a:ext cx="8865360" cy="1473120"/>
+            <a:ext cx="8865000" cy="1472760"/>
           </a:xfrm>
           <a:prstGeom prst="rect">
             <a:avLst/>
@@ -6500,6 +6519,7 @@
                   <a:srgbClr val="2c7c9f"/>
                 </a:solidFill>
                 <a:latin typeface="News Gothic MT"/>
+                <a:ea typeface="DejaVu Sans"/>
               </a:rPr>
               <a:t>Precision-Recall Curve</a:t>
             </a:r>
@@ -6519,8 +6539,8 @@
         </p:blipFill>
         <p:spPr>
           <a:xfrm>
-            <a:off x="6491880" y="1692000"/>
-            <a:ext cx="3202560" cy="5730120"/>
+            <a:off x="6023880" y="1692000"/>
+            <a:ext cx="3202200" cy="5729760"/>
           </a:xfrm>
           <a:prstGeom prst="rect">
             <a:avLst/>
@@ -6539,7 +6559,7 @@
         <p:spPr>
           <a:xfrm>
             <a:off x="317520" y="2052000"/>
-            <a:ext cx="6085800" cy="4786920"/>
+            <a:ext cx="6085440" cy="4786560"/>
           </a:xfrm>
           <a:prstGeom prst="rect">
             <a:avLst/>
@@ -6572,8 +6592,20 @@
                   <a:srgbClr val="595959"/>
                 </a:solidFill>
                 <a:latin typeface="News Gothic MT"/>
-              </a:rPr>
-              <a:t>tl;dr how well does the model separate the classes?</a:t>
+                <a:ea typeface="DejaVu Sans"/>
+              </a:rPr>
+              <a:t>How well does the model separate the classes?</a:t>
+            </a:r>
+            <a:r>
+              <a:rPr lang="en-US" sz="2600" strike="noStrike">
+                <a:solidFill>
+                  <a:srgbClr val="595959"/>
+                </a:solidFill>
+                <a:latin typeface="News Gothic MT"/>
+                <a:ea typeface="DejaVu Sans"/>
+              </a:rPr>
+              <a:t>
+</a:t>
             </a:r>
             <a:endParaRPr/>
           </a:p>
@@ -6592,6 +6624,7 @@
                   <a:srgbClr val="595959"/>
                 </a:solidFill>
                 <a:latin typeface="News Gothic MT"/>
+                <a:ea typeface="DejaVu Sans"/>
               </a:rPr>
               <a:t>Recall =</a:t>
             </a:r>
@@ -6612,6 +6645,7 @@
                   <a:srgbClr val="595959"/>
                 </a:solidFill>
                 <a:latin typeface="News Gothic MT"/>
+                <a:ea typeface="DejaVu Sans"/>
               </a:rPr>
               <a:t>num relevant elements retrieved / num relevant elements overall</a:t>
             </a:r>
@@ -6626,15 +6660,6 @@
               <a:buFont typeface="Arial"/>
               <a:buChar char="•"/>
             </a:pPr>
-            <a:r>
-              <a:rPr lang="en-US" sz="2600" strike="noStrike">
-                <a:solidFill>
-                  <a:srgbClr val="595959"/>
-                </a:solidFill>
-                <a:latin typeface="News Gothic MT"/>
-              </a:rPr>
-              <a:t>Precision =</a:t>
-            </a:r>
             <a:endParaRPr/>
           </a:p>
           <a:p>
@@ -6652,6 +6677,28 @@
                   <a:srgbClr val="595959"/>
                 </a:solidFill>
                 <a:latin typeface="News Gothic MT"/>
+                <a:ea typeface="DejaVu Sans"/>
+              </a:rPr>
+              <a:t>Precision =</a:t>
+            </a:r>
+            <a:endParaRPr/>
+          </a:p>
+          <a:p>
+            <a:pPr>
+              <a:lnSpc>
+                <a:spcPct val="100000"/>
+              </a:lnSpc>
+              <a:buSzPct val="110000"/>
+              <a:buFont typeface="Arial"/>
+              <a:buChar char="•"/>
+            </a:pPr>
+            <a:r>
+              <a:rPr lang="en-US" sz="2600" strike="noStrike">
+                <a:solidFill>
+                  <a:srgbClr val="595959"/>
+                </a:solidFill>
+                <a:latin typeface="News Gothic MT"/>
+                <a:ea typeface="DejaVu Sans"/>
               </a:rPr>
               <a:t>num relevant elements retrieved / total # elements retrieved</a:t>
             </a:r>
@@ -6725,7 +6772,7 @@
         <p:spPr>
           <a:xfrm>
             <a:off x="605520" y="118440"/>
-            <a:ext cx="8865360" cy="1473120"/>
+            <a:ext cx="8865000" cy="1472760"/>
           </a:xfrm>
           <a:prstGeom prst="rect">
             <a:avLst/>
@@ -6755,6 +6802,7 @@
                   <a:srgbClr val="2c7c9f"/>
                 </a:solidFill>
                 <a:latin typeface="News Gothic MT"/>
+                <a:ea typeface="DejaVu Sans"/>
               </a:rPr>
               <a:t>Malaga Precision-Recall</a:t>
             </a:r>
@@ -6775,7 +6823,7 @@
         <p:spPr>
           <a:xfrm>
             <a:off x="1423440" y="1715040"/>
-            <a:ext cx="7392240" cy="5636880"/>
+            <a:ext cx="7391880" cy="5636520"/>
           </a:xfrm>
           <a:prstGeom prst="rect">
             <a:avLst/>
@@ -6843,7 +6891,7 @@
         <p:spPr>
           <a:xfrm>
             <a:off x="605520" y="118440"/>
-            <a:ext cx="8865360" cy="1473120"/>
+            <a:ext cx="8865000" cy="1472760"/>
           </a:xfrm>
           <a:prstGeom prst="rect">
             <a:avLst/>
@@ -6873,6 +6921,7 @@
                   <a:srgbClr val="2c7c9f"/>
                 </a:solidFill>
                 <a:latin typeface="News Gothic MT"/>
+                <a:ea typeface="DejaVu Sans"/>
               </a:rPr>
               <a:t>cluubcd</a:t>
             </a:r>
@@ -6882,6 +6931,7 @@
                   <a:srgbClr val="2c7c9f"/>
                 </a:solidFill>
                 <a:latin typeface="News Gothic MT"/>
+                <a:ea typeface="DejaVu Sans"/>
               </a:rPr>
               <a:t> Precision-Recall</a:t>
             </a:r>
@@ -6902,7 +6952,7 @@
         <p:spPr>
           <a:xfrm>
             <a:off x="1324800" y="1620000"/>
-            <a:ext cx="7656480" cy="5761800"/>
+            <a:ext cx="7656120" cy="5761440"/>
           </a:xfrm>
           <a:prstGeom prst="rect">
             <a:avLst/>
@@ -6970,7 +7020,7 @@
         <p:spPr>
           <a:xfrm>
             <a:off x="605520" y="118440"/>
-            <a:ext cx="8865360" cy="1473120"/>
+            <a:ext cx="8865000" cy="1472760"/>
           </a:xfrm>
           <a:prstGeom prst="rect">
             <a:avLst/>
@@ -7000,6 +7050,7 @@
                   <a:srgbClr val="2c7c9f"/>
                 </a:solidFill>
                 <a:latin typeface="News Gothic MT"/>
+                <a:ea typeface="DejaVu Sans"/>
               </a:rPr>
               <a:t>Neural network training experiment</a:t>
             </a:r>
@@ -7016,7 +7067,7 @@
         <p:spPr>
           <a:xfrm>
             <a:off x="605520" y="1764000"/>
-            <a:ext cx="8865360" cy="4786920"/>
+            <a:ext cx="8865000" cy="4786560"/>
           </a:xfrm>
           <a:prstGeom prst="rect">
             <a:avLst/>
@@ -7049,8 +7100,20 @@
                   <a:srgbClr val="595959"/>
                 </a:solidFill>
                 <a:latin typeface="News Gothic MT"/>
+                <a:ea typeface="DejaVu Sans"/>
               </a:rPr>
               <a:t>We made a pre-trained neural network work, how about trying to train a CNN on our own data?</a:t>
+            </a:r>
+            <a:r>
+              <a:rPr lang="en-US" sz="2400" strike="noStrike">
+                <a:solidFill>
+                  <a:srgbClr val="595959"/>
+                </a:solidFill>
+                <a:latin typeface="News Gothic MT"/>
+                <a:ea typeface="DejaVu Sans"/>
+              </a:rPr>
+              <a:t>
+</a:t>
             </a:r>
             <a:endParaRPr/>
           </a:p>
@@ -7069,8 +7132,20 @@
                   <a:srgbClr val="595959"/>
                 </a:solidFill>
                 <a:latin typeface="News Gothic MT"/>
+                <a:ea typeface="DejaVu Sans"/>
               </a:rPr>
               <a:t>Caffe: deep learning framework out of UC Berkeley</a:t>
+            </a:r>
+            <a:r>
+              <a:rPr lang="en-US" sz="2400" strike="noStrike">
+                <a:solidFill>
+                  <a:srgbClr val="595959"/>
+                </a:solidFill>
+                <a:latin typeface="News Gothic MT"/>
+                <a:ea typeface="DejaVu Sans"/>
+              </a:rPr>
+              <a:t>
+</a:t>
             </a:r>
             <a:endParaRPr/>
           </a:p>
@@ -7089,6 +7164,7 @@
                   <a:srgbClr val="595959"/>
                 </a:solidFill>
                 <a:latin typeface="News Gothic MT"/>
+                <a:ea typeface="DejaVu Sans"/>
               </a:rPr>
               <a:t>Imagenet framework on Malaga Dataset Extract #7</a:t>
             </a:r>
@@ -7109,9 +7185,42 @@
                   <a:srgbClr val="595959"/>
                 </a:solidFill>
                 <a:latin typeface="News Gothic MT"/>
-              </a:rPr>
-              <a:t>In general: train on images from first loop, classify on images from second loop</a:t>
-            </a:r>
+                <a:ea typeface="DejaVu Sans"/>
+              </a:rPr>
+              <a:t>- train on images from first loop</a:t>
+            </a:r>
+            <a:endParaRPr/>
+          </a:p>
+          <a:p>
+            <a:pPr lvl="1">
+              <a:lnSpc>
+                <a:spcPct val="100000"/>
+              </a:lnSpc>
+              <a:buSzPct val="75000"/>
+              <a:buFont typeface="StarSymbol"/>
+              <a:buChar char="l"/>
+            </a:pPr>
+            <a:r>
+              <a:rPr lang="en-US" sz="2400" strike="noStrike">
+                <a:solidFill>
+                  <a:srgbClr val="595959"/>
+                </a:solidFill>
+                <a:latin typeface="News Gothic MT"/>
+                <a:ea typeface="DejaVu Sans"/>
+              </a:rPr>
+              <a:t>- classify on images from second loop</a:t>
+            </a:r>
+            <a:endParaRPr/>
+          </a:p>
+          <a:p>
+            <a:pPr lvl="1">
+              <a:lnSpc>
+                <a:spcPct val="100000"/>
+              </a:lnSpc>
+              <a:buSzPct val="75000"/>
+              <a:buFont typeface="StarSymbol"/>
+              <a:buChar char="l"/>
+            </a:pPr>
             <a:endParaRPr/>
           </a:p>
           <a:p>
@@ -7129,6 +7238,7 @@
                   <a:srgbClr val="595959"/>
                 </a:solidFill>
                 <a:latin typeface="News Gothic MT"/>
+                <a:ea typeface="DejaVu Sans"/>
               </a:rPr>
               <a:t>Results may likely improve with a larger dataset</a:t>
             </a:r>
@@ -7153,7 +7263,7 @@
         <p:spPr>
           <a:xfrm>
             <a:off x="504000" y="6967440"/>
-            <a:ext cx="9576000" cy="365760"/>
+            <a:ext cx="9575640" cy="365400"/>
           </a:xfrm>
           <a:prstGeom prst="rect">
             <a:avLst/>
@@ -7249,7 +7359,7 @@
         <p:spPr>
           <a:xfrm>
             <a:off x="605520" y="118440"/>
-            <a:ext cx="8865360" cy="1473120"/>
+            <a:ext cx="8865000" cy="1472760"/>
           </a:xfrm>
           <a:prstGeom prst="rect">
             <a:avLst/>
@@ -7279,6 +7389,7 @@
                   <a:srgbClr val="2c7c9f"/>
                 </a:solidFill>
                 <a:latin typeface="News Gothic MT"/>
+                <a:ea typeface="DejaVu Sans"/>
               </a:rPr>
               <a:t>Results and Future Work</a:t>
             </a:r>
@@ -7295,7 +7406,7 @@
         <p:spPr>
           <a:xfrm>
             <a:off x="605520" y="1764000"/>
-            <a:ext cx="8865360" cy="4786920"/>
+            <a:ext cx="8865000" cy="4786560"/>
           </a:xfrm>
           <a:prstGeom prst="rect">
             <a:avLst/>
@@ -7314,9 +7425,18 @@
         <p:txBody>
           <a:bodyPr lIns="100800" rIns="100800" tIns="50400" bIns="50400"/>
           <a:p>
+            <a:pPr>
+              <a:buSzPct val="45000"/>
+              <a:buFont typeface="StarSymbol"/>
+              <a:buChar char=""/>
+            </a:pPr>
             <a:r>
               <a:rPr lang="en-US" sz="2600" strike="noStrike">
-                <a:latin typeface="News Gothic MT"/>
+                <a:solidFill>
+                  <a:srgbClr val="000000"/>
+                </a:solidFill>
+                <a:latin typeface="News Gothic MT"/>
+                <a:ea typeface="DejaVu Sans"/>
               </a:rPr>
               <a:t>Video Google-style BoW worked well on our </a:t>
             </a:r>
@@ -7329,13 +7449,28 @@
               </a:lnSpc>
               <a:buSzPct val="45000"/>
               <a:buFont typeface="StarSymbol"/>
-              <a:buChar char="l"/>
+              <a:buChar char=""/>
             </a:pPr>
             <a:r>
               <a:rPr lang="en-US" sz="2600" strike="noStrike">
-                <a:latin typeface="News Gothic MT"/>
+                <a:solidFill>
+                  <a:srgbClr val="000000"/>
+                </a:solidFill>
+                <a:latin typeface="News Gothic MT"/>
+                <a:ea typeface="DejaVu Sans"/>
               </a:rPr>
               <a:t>small datasets</a:t>
+            </a:r>
+            <a:r>
+              <a:rPr lang="en-US" sz="2600" strike="noStrike">
+                <a:solidFill>
+                  <a:srgbClr val="000000"/>
+                </a:solidFill>
+                <a:latin typeface="News Gothic MT"/>
+                <a:ea typeface="DejaVu Sans"/>
+              </a:rPr>
+              <a:t>
+</a:t>
             </a:r>
             <a:endParaRPr/>
           </a:p>
@@ -7346,13 +7481,28 @@
               </a:lnSpc>
               <a:buSzPct val="45000"/>
               <a:buFont typeface="StarSymbol"/>
-              <a:buChar char="l"/>
+              <a:buChar char=""/>
             </a:pPr>
             <a:r>
               <a:rPr lang="en-US" sz="2600" strike="noStrike">
-                <a:latin typeface="News Gothic MT"/>
+                <a:solidFill>
+                  <a:srgbClr val="000000"/>
+                </a:solidFill>
+                <a:latin typeface="News Gothic MT"/>
+                <a:ea typeface="DejaVu Sans"/>
               </a:rPr>
               <a:t>BoW with OverFeat also worked well</a:t>
+            </a:r>
+            <a:r>
+              <a:rPr lang="en-US" sz="2600" strike="noStrike">
+                <a:solidFill>
+                  <a:srgbClr val="000000"/>
+                </a:solidFill>
+                <a:latin typeface="News Gothic MT"/>
+                <a:ea typeface="DejaVu Sans"/>
+              </a:rPr>
+              <a:t>
+</a:t>
             </a:r>
             <a:endParaRPr/>
           </a:p>
@@ -7363,13 +7513,28 @@
               </a:lnSpc>
               <a:buSzPct val="45000"/>
               <a:buFont typeface="StarSymbol"/>
-              <a:buChar char="l"/>
+              <a:buChar char=""/>
             </a:pPr>
             <a:r>
               <a:rPr lang="en-US" sz="2600" strike="noStrike">
-                <a:latin typeface="News Gothic MT"/>
+                <a:solidFill>
+                  <a:srgbClr val="000000"/>
+                </a:solidFill>
+                <a:latin typeface="News Gothic MT"/>
+                <a:ea typeface="DejaVu Sans"/>
               </a:rPr>
               <a:t>Caffe needs a little work</a:t>
+            </a:r>
+            <a:r>
+              <a:rPr lang="en-US" sz="2600" strike="noStrike">
+                <a:solidFill>
+                  <a:srgbClr val="000000"/>
+                </a:solidFill>
+                <a:latin typeface="News Gothic MT"/>
+                <a:ea typeface="DejaVu Sans"/>
+              </a:rPr>
+              <a:t>
+</a:t>
             </a:r>
             <a:endParaRPr/>
           </a:p>
@@ -7380,13 +7545,28 @@
               </a:lnSpc>
               <a:buSzPct val="45000"/>
               <a:buFont typeface="StarSymbol"/>
-              <a:buChar char="l"/>
+              <a:buChar char=""/>
             </a:pPr>
             <a:r>
               <a:rPr lang="en-US" sz="2600" strike="noStrike">
-                <a:latin typeface="News Gothic MT"/>
+                <a:solidFill>
+                  <a:srgbClr val="000000"/>
+                </a:solidFill>
+                <a:latin typeface="News Gothic MT"/>
+                <a:ea typeface="DejaVu Sans"/>
               </a:rPr>
               <a:t>Trying larger datasets?</a:t>
+            </a:r>
+            <a:r>
+              <a:rPr lang="en-US" sz="2600" strike="noStrike">
+                <a:solidFill>
+                  <a:srgbClr val="000000"/>
+                </a:solidFill>
+                <a:latin typeface="News Gothic MT"/>
+                <a:ea typeface="DejaVu Sans"/>
+              </a:rPr>
+              <a:t>
+</a:t>
             </a:r>
             <a:endParaRPr/>
           </a:p>
@@ -7397,13 +7577,28 @@
               </a:lnSpc>
               <a:buSzPct val="45000"/>
               <a:buFont typeface="StarSymbol"/>
-              <a:buChar char="l"/>
+              <a:buChar char=""/>
             </a:pPr>
             <a:r>
               <a:rPr lang="en-US" sz="2600" strike="noStrike">
-                <a:latin typeface="News Gothic MT"/>
+                <a:solidFill>
+                  <a:srgbClr val="000000"/>
+                </a:solidFill>
+                <a:latin typeface="News Gothic MT"/>
+                <a:ea typeface="DejaVu Sans"/>
               </a:rPr>
               <a:t>Different feature normalization methods?</a:t>
+            </a:r>
+            <a:r>
+              <a:rPr lang="en-US" sz="2600" strike="noStrike">
+                <a:solidFill>
+                  <a:srgbClr val="000000"/>
+                </a:solidFill>
+                <a:latin typeface="News Gothic MT"/>
+                <a:ea typeface="DejaVu Sans"/>
+              </a:rPr>
+              <a:t>
+</a:t>
             </a:r>
             <a:endParaRPr/>
           </a:p>
@@ -7414,11 +7609,15 @@
               </a:lnSpc>
               <a:buSzPct val="45000"/>
               <a:buFont typeface="StarSymbol"/>
-              <a:buChar char="l"/>
+              <a:buChar char=""/>
             </a:pPr>
             <a:r>
               <a:rPr lang="en-US" sz="2600" strike="noStrike">
-                <a:latin typeface="News Gothic MT"/>
+                <a:solidFill>
+                  <a:srgbClr val="000000"/>
+                </a:solidFill>
+                <a:latin typeface="News Gothic MT"/>
+                <a:ea typeface="DejaVu Sans"/>
               </a:rPr>
               <a:t>HoG and other kinds of descriptors?</a:t>
             </a:r>
@@ -7484,7 +7683,7 @@
         <p:spPr>
           <a:xfrm>
             <a:off x="605520" y="118440"/>
-            <a:ext cx="8865360" cy="1473120"/>
+            <a:ext cx="8865000" cy="1472760"/>
           </a:xfrm>
           <a:prstGeom prst="rect">
             <a:avLst/>
@@ -7514,6 +7713,7 @@
                   <a:srgbClr val="2c7c9f"/>
                 </a:solidFill>
                 <a:latin typeface="News Gothic MT"/>
+                <a:ea typeface="DejaVu Sans"/>
               </a:rPr>
               <a:t>Sources</a:t>
             </a:r>
@@ -7530,7 +7730,7 @@
         <p:spPr>
           <a:xfrm>
             <a:off x="605520" y="1764000"/>
-            <a:ext cx="8865360" cy="4786920"/>
+            <a:ext cx="8865000" cy="4786560"/>
           </a:xfrm>
           <a:prstGeom prst="rect">
             <a:avLst/>
@@ -7559,9 +7759,24 @@
             </a:pPr>
             <a:r>
               <a:rPr lang="en-US" sz="2400" strike="noStrike">
-                <a:latin typeface="News Gothic MT"/>
+                <a:solidFill>
+                  <a:srgbClr val="000000"/>
+                </a:solidFill>
+                <a:latin typeface="News Gothic MT"/>
+                <a:ea typeface="DejaVu Sans"/>
               </a:rPr>
               <a:t>Video Google: robots.ox.ac.uk/~vgg/publications/papers/sivic03.pdf</a:t>
+            </a:r>
+            <a:r>
+              <a:rPr lang="en-US" sz="2400" strike="noStrike">
+                <a:solidFill>
+                  <a:srgbClr val="000000"/>
+                </a:solidFill>
+                <a:latin typeface="News Gothic MT"/>
+                <a:ea typeface="DejaVu Sans"/>
+              </a:rPr>
+              <a:t>
+</a:t>
             </a:r>
             <a:endParaRPr/>
           </a:p>
@@ -7573,9 +7788,24 @@
             </a:pPr>
             <a:r>
               <a:rPr lang="en-US" sz="2400" strike="noStrike">
-                <a:latin typeface="News Gothic MT"/>
+                <a:solidFill>
+                  <a:srgbClr val="000000"/>
+                </a:solidFill>
+                <a:latin typeface="News Gothic MT"/>
+                <a:ea typeface="DejaVu Sans"/>
               </a:rPr>
               <a:t>Overfeat: github.com/sermanet/OverFeat</a:t>
+            </a:r>
+            <a:r>
+              <a:rPr lang="en-US" sz="2400" strike="noStrike">
+                <a:solidFill>
+                  <a:srgbClr val="000000"/>
+                </a:solidFill>
+                <a:latin typeface="News Gothic MT"/>
+                <a:ea typeface="DejaVu Sans"/>
+              </a:rPr>
+              <a:t>
+</a:t>
             </a:r>
             <a:endParaRPr/>
           </a:p>
@@ -7587,7 +7817,11 @@
             </a:pPr>
             <a:r>
               <a:rPr lang="en-US" sz="2400" strike="noStrike">
-                <a:latin typeface="News Gothic MT"/>
+                <a:solidFill>
+                  <a:srgbClr val="000000"/>
+                </a:solidFill>
+                <a:latin typeface="News Gothic MT"/>
+                <a:ea typeface="DejaVu Sans"/>
               </a:rPr>
               <a:t>CAFFE: caffe.berkeleyvision.org/</a:t>
             </a:r>
@@ -7677,7 +7911,7 @@
         <p:spPr>
           <a:xfrm>
             <a:off x="605520" y="118440"/>
-            <a:ext cx="8865360" cy="1473120"/>
+            <a:ext cx="8865000" cy="1472760"/>
           </a:xfrm>
           <a:prstGeom prst="rect">
             <a:avLst/>
@@ -7707,6 +7941,7 @@
                   <a:srgbClr val="2c7c9f"/>
                 </a:solidFill>
                 <a:latin typeface="News Gothic MT"/>
+                <a:ea typeface="DejaVu Sans"/>
               </a:rPr>
               <a:t>Project Overview</a:t>
             </a:r>
@@ -7722,8 +7957,8 @@
         </p:nvSpPr>
         <p:spPr>
           <a:xfrm>
-            <a:off x="605520" y="1764000"/>
-            <a:ext cx="8865360" cy="4786920"/>
+            <a:off x="677520" y="2052000"/>
+            <a:ext cx="8865000" cy="4786560"/>
           </a:xfrm>
           <a:prstGeom prst="rect">
             <a:avLst/>
@@ -7756,6 +7991,7 @@
                   <a:srgbClr val="595959"/>
                 </a:solidFill>
                 <a:latin typeface="News Gothic MT"/>
+                <a:ea typeface="DejaVu Sans"/>
               </a:rPr>
               <a:t>Place Recognition using two different methods</a:t>
             </a:r>
@@ -7776,6 +8012,7 @@
                   <a:srgbClr val="595959"/>
                 </a:solidFill>
                 <a:latin typeface="News Gothic MT"/>
+                <a:ea typeface="DejaVu Sans"/>
               </a:rPr>
               <a:t>Bag of Words with SIFT descriptors</a:t>
             </a:r>
@@ -7796,8 +8033,20 @@
                   <a:srgbClr val="595959"/>
                 </a:solidFill>
                 <a:latin typeface="News Gothic MT"/>
+                <a:ea typeface="DejaVu Sans"/>
               </a:rPr>
               <a:t>Features extracted from a Convolution Neural Network</a:t>
+            </a:r>
+            <a:r>
+              <a:rPr lang="en-US" sz="2200" strike="noStrike">
+                <a:solidFill>
+                  <a:srgbClr val="595959"/>
+                </a:solidFill>
+                <a:latin typeface="News Gothic MT"/>
+                <a:ea typeface="DejaVu Sans"/>
+              </a:rPr>
+              <a:t>
+</a:t>
             </a:r>
             <a:endParaRPr/>
           </a:p>
@@ -7816,8 +8065,20 @@
                   <a:srgbClr val="595959"/>
                 </a:solidFill>
                 <a:latin typeface="News Gothic MT"/>
+                <a:ea typeface="DejaVu Sans"/>
               </a:rPr>
               <a:t>Classify with One-Against-All SVM</a:t>
+            </a:r>
+            <a:r>
+              <a:rPr lang="en-US" sz="2600" strike="noStrike">
+                <a:solidFill>
+                  <a:srgbClr val="595959"/>
+                </a:solidFill>
+                <a:latin typeface="News Gothic MT"/>
+                <a:ea typeface="DejaVu Sans"/>
+              </a:rPr>
+              <a:t>
+</a:t>
             </a:r>
             <a:endParaRPr/>
           </a:p>
@@ -7836,8 +8097,20 @@
                   <a:srgbClr val="595959"/>
                 </a:solidFill>
                 <a:latin typeface="News Gothic MT"/>
+                <a:ea typeface="DejaVu Sans"/>
               </a:rPr>
               <a:t>Test for loop closure on Malaga Urban Dataset</a:t>
+            </a:r>
+            <a:r>
+              <a:rPr lang="en-US" sz="2600" strike="noStrike">
+                <a:solidFill>
+                  <a:srgbClr val="595959"/>
+                </a:solidFill>
+                <a:latin typeface="News Gothic MT"/>
+                <a:ea typeface="DejaVu Sans"/>
+              </a:rPr>
+              <a:t>
+</a:t>
             </a:r>
             <a:endParaRPr/>
           </a:p>
@@ -7856,6 +8129,7 @@
                   <a:srgbClr val="595959"/>
                 </a:solidFill>
                 <a:latin typeface="News Gothic MT"/>
+                <a:ea typeface="DejaVu Sans"/>
               </a:rPr>
               <a:t>Test for loop closure on custom local Boulder university urban campus dataset (</a:t>
             </a:r>
@@ -7865,6 +8139,7 @@
                   <a:srgbClr val="595959"/>
                 </a:solidFill>
                 <a:latin typeface="News Gothic MT"/>
+                <a:ea typeface="DejaVu Sans"/>
               </a:rPr>
               <a:t>clbuucd</a:t>
             </a:r>
@@ -7874,6 +8149,7 @@
                   <a:srgbClr val="595959"/>
                 </a:solidFill>
                 <a:latin typeface="News Gothic MT"/>
+                <a:ea typeface="DejaVu Sans"/>
               </a:rPr>
               <a:t>)</a:t>
             </a:r>
@@ -7939,7 +8215,7 @@
         <p:spPr>
           <a:xfrm>
             <a:off x="605520" y="118440"/>
-            <a:ext cx="8865360" cy="1473120"/>
+            <a:ext cx="8865000" cy="1472760"/>
           </a:xfrm>
           <a:prstGeom prst="rect">
             <a:avLst/>
@@ -7969,6 +8245,7 @@
                   <a:srgbClr val="2c7c9f"/>
                 </a:solidFill>
                 <a:latin typeface="News Gothic MT"/>
+                <a:ea typeface="DejaVu Sans"/>
               </a:rPr>
               <a:t>Malaga Urban Dataset Extract #7</a:t>
             </a:r>
@@ -7985,7 +8262,7 @@
         <p:spPr>
           <a:xfrm>
             <a:off x="389520" y="1764000"/>
-            <a:ext cx="4880520" cy="3904920"/>
+            <a:ext cx="4880160" cy="3904560"/>
           </a:xfrm>
           <a:prstGeom prst="rect">
             <a:avLst/>
@@ -8018,6 +8295,7 @@
                   <a:srgbClr val="595959"/>
                 </a:solidFill>
                 <a:latin typeface="News Gothic MT"/>
+                <a:ea typeface="DejaVu Sans"/>
               </a:rPr>
               <a:t>“</a:t>
             </a:r>
@@ -8027,8 +8305,20 @@
                   <a:srgbClr val="595959"/>
                 </a:solidFill>
                 <a:latin typeface="News Gothic MT"/>
+                <a:ea typeface="DejaVu Sans"/>
               </a:rPr>
               <a:t>Short avenue loop closure”</a:t>
+            </a:r>
+            <a:r>
+              <a:rPr lang="en-US" sz="2200" strike="noStrike">
+                <a:solidFill>
+                  <a:srgbClr val="595959"/>
+                </a:solidFill>
+                <a:latin typeface="News Gothic MT"/>
+                <a:ea typeface="DejaVu Sans"/>
+              </a:rPr>
+              <a:t>
+</a:t>
             </a:r>
             <a:endParaRPr/>
           </a:p>
@@ -8047,8 +8337,20 @@
                   <a:srgbClr val="595959"/>
                 </a:solidFill>
                 <a:latin typeface="News Gothic MT"/>
+                <a:ea typeface="DejaVu Sans"/>
               </a:rPr>
               <a:t>~1700 raw stereo images</a:t>
+            </a:r>
+            <a:r>
+              <a:rPr lang="en-US" sz="2200" strike="noStrike">
+                <a:solidFill>
+                  <a:srgbClr val="595959"/>
+                </a:solidFill>
+                <a:latin typeface="News Gothic MT"/>
+                <a:ea typeface="DejaVu Sans"/>
+              </a:rPr>
+              <a:t>
+</a:t>
             </a:r>
             <a:endParaRPr/>
           </a:p>
@@ -8067,8 +8369,20 @@
                   <a:srgbClr val="595959"/>
                 </a:solidFill>
                 <a:latin typeface="News Gothic MT"/>
+                <a:ea typeface="DejaVu Sans"/>
               </a:rPr>
               <a:t>Dataset also includes camera data, GPS data, LIDAR data</a:t>
+            </a:r>
+            <a:r>
+              <a:rPr lang="en-US" sz="2200" strike="noStrike">
+                <a:solidFill>
+                  <a:srgbClr val="595959"/>
+                </a:solidFill>
+                <a:latin typeface="News Gothic MT"/>
+                <a:ea typeface="DejaVu Sans"/>
+              </a:rPr>
+              <a:t>
+</a:t>
             </a:r>
             <a:endParaRPr/>
           </a:p>
@@ -8087,6 +8401,7 @@
                   <a:srgbClr val="595959"/>
                 </a:solidFill>
                 <a:latin typeface="News Gothic MT"/>
+                <a:ea typeface="DejaVu Sans"/>
               </a:rPr>
               <a:t>Use left camera and GPS data</a:t>
             </a:r>
@@ -8107,8 +8422,9 @@
                   <a:srgbClr val="595959"/>
                 </a:solidFill>
                 <a:latin typeface="News Gothic MT"/>
-              </a:rPr>
-              <a:t>camera for place recognition</a:t>
+                <a:ea typeface="DejaVu Sans"/>
+              </a:rPr>
+              <a:t>- camera for place recognition</a:t>
             </a:r>
             <a:endParaRPr/>
           </a:p>
@@ -8127,8 +8443,9 @@
                   <a:srgbClr val="595959"/>
                 </a:solidFill>
                 <a:latin typeface="News Gothic MT"/>
-              </a:rPr>
-              <a:t>GPS data to visualize path and loop closure</a:t>
+                <a:ea typeface="DejaVu Sans"/>
+              </a:rPr>
+              <a:t>- GPS data to visualize path and loop closure</a:t>
             </a:r>
             <a:endParaRPr/>
           </a:p>
@@ -8151,7 +8468,7 @@
         <p:spPr>
           <a:xfrm>
             <a:off x="321840" y="6850800"/>
-            <a:ext cx="9757800" cy="364320"/>
+            <a:ext cx="9757440" cy="363960"/>
           </a:xfrm>
           <a:prstGeom prst="rect">
             <a:avLst/>
@@ -8202,7 +8519,7 @@
         <p:spPr>
           <a:xfrm>
             <a:off x="5178960" y="1866600"/>
-            <a:ext cx="4513320" cy="4442400"/>
+            <a:ext cx="4512960" cy="4442040"/>
           </a:xfrm>
           <a:prstGeom prst="rect">
             <a:avLst/>
@@ -8274,7 +8591,7 @@
         <p:spPr>
           <a:xfrm>
             <a:off x="2226960" y="0"/>
-            <a:ext cx="5123160" cy="3658680"/>
+            <a:ext cx="5122800" cy="3658320"/>
           </a:xfrm>
           <a:prstGeom prst="rect">
             <a:avLst/>
@@ -8297,7 +8614,7 @@
         <p:spPr>
           <a:xfrm>
             <a:off x="2226960" y="3763800"/>
-            <a:ext cx="5123160" cy="3795120"/>
+            <a:ext cx="5122800" cy="3794760"/>
           </a:xfrm>
           <a:prstGeom prst="rect">
             <a:avLst/>
@@ -8493,7 +8810,7 @@
         <p:spPr>
           <a:xfrm>
             <a:off x="605520" y="118440"/>
-            <a:ext cx="8865360" cy="1473120"/>
+            <a:ext cx="8865000" cy="1472760"/>
           </a:xfrm>
           <a:prstGeom prst="rect">
             <a:avLst/>
@@ -8523,6 +8840,7 @@
                   <a:srgbClr val="2c7c9f"/>
                 </a:solidFill>
                 <a:latin typeface="News Gothic MT"/>
+                <a:ea typeface="DejaVu Sans"/>
               </a:rPr>
               <a:t>Campus Dataset, </a:t>
             </a:r>
@@ -8532,6 +8850,7 @@
                   <a:srgbClr val="2c7c9f"/>
                 </a:solidFill>
                 <a:latin typeface="News Gothic MT"/>
+                <a:ea typeface="DejaVu Sans"/>
               </a:rPr>
               <a:t>clbuucd</a:t>
             </a:r>
@@ -8547,8 +8866,8 @@
         </p:nvSpPr>
         <p:spPr>
           <a:xfrm>
-            <a:off x="245520" y="1800000"/>
-            <a:ext cx="5154840" cy="4600440"/>
+            <a:off x="317520" y="1836000"/>
+            <a:ext cx="5154480" cy="4600080"/>
           </a:xfrm>
           <a:prstGeom prst="rect">
             <a:avLst/>
@@ -8573,7 +8892,7 @@
               </a:lnSpc>
               <a:buSzPct val="45000"/>
               <a:buFont typeface="StarSymbol"/>
-              <a:buChar char="l"/>
+              <a:buChar char=""/>
             </a:pPr>
             <a:r>
               <a:rPr lang="en-US" sz="2200" strike="noStrike">
@@ -8581,6 +8900,7 @@
                   <a:srgbClr val="595959"/>
                 </a:solidFill>
                 <a:latin typeface="News Gothic MT"/>
+                <a:ea typeface="DejaVu Sans"/>
               </a:rPr>
               <a:t>Short </a:t>
             </a:r>
@@ -8590,6 +8910,7 @@
                   <a:srgbClr val="595959"/>
                 </a:solidFill>
                 <a:latin typeface="News Gothic MT"/>
+                <a:ea typeface="DejaVu Sans"/>
               </a:rPr>
               <a:t>walking</a:t>
             </a:r>
@@ -8599,8 +8920,20 @@
                   <a:srgbClr val="595959"/>
                 </a:solidFill>
                 <a:latin typeface="News Gothic MT"/>
+                <a:ea typeface="DejaVu Sans"/>
               </a:rPr>
               <a:t> loop closure</a:t>
+            </a:r>
+            <a:r>
+              <a:rPr lang="en-US" sz="2200" strike="noStrike">
+                <a:solidFill>
+                  <a:srgbClr val="595959"/>
+                </a:solidFill>
+                <a:latin typeface="News Gothic MT"/>
+                <a:ea typeface="DejaVu Sans"/>
+              </a:rPr>
+              <a:t>
+</a:t>
             </a:r>
             <a:endParaRPr/>
           </a:p>
@@ -8611,7 +8944,7 @@
               </a:lnSpc>
               <a:buSzPct val="45000"/>
               <a:buFont typeface="StarSymbol"/>
-              <a:buChar char="l"/>
+              <a:buChar char=""/>
             </a:pPr>
             <a:r>
               <a:rPr lang="en-US" sz="2200" strike="noStrike">
@@ -8619,8 +8952,20 @@
                   <a:srgbClr val="595959"/>
                 </a:solidFill>
                 <a:latin typeface="News Gothic MT"/>
+                <a:ea typeface="DejaVu Sans"/>
               </a:rPr>
               <a:t>248 images</a:t>
+            </a:r>
+            <a:r>
+              <a:rPr lang="en-US" sz="2200" strike="noStrike">
+                <a:solidFill>
+                  <a:srgbClr val="595959"/>
+                </a:solidFill>
+                <a:latin typeface="News Gothic MT"/>
+                <a:ea typeface="DejaVu Sans"/>
+              </a:rPr>
+              <a:t>
+</a:t>
             </a:r>
             <a:endParaRPr/>
           </a:p>
@@ -8631,7 +8976,7 @@
               </a:lnSpc>
               <a:buSzPct val="45000"/>
               <a:buFont typeface="StarSymbol"/>
-              <a:buChar char="l"/>
+              <a:buChar char=""/>
             </a:pPr>
             <a:r>
               <a:rPr lang="en-US" sz="2200" strike="noStrike">
@@ -8639,8 +8984,20 @@
                   <a:srgbClr val="595959"/>
                 </a:solidFill>
                 <a:latin typeface="News Gothic MT"/>
+                <a:ea typeface="DejaVu Sans"/>
               </a:rPr>
               <a:t>Images distance ~22 ft</a:t>
+            </a:r>
+            <a:r>
+              <a:rPr lang="en-US" sz="2200" strike="noStrike">
+                <a:solidFill>
+                  <a:srgbClr val="595959"/>
+                </a:solidFill>
+                <a:latin typeface="News Gothic MT"/>
+                <a:ea typeface="DejaVu Sans"/>
+              </a:rPr>
+              <a:t>
+</a:t>
             </a:r>
             <a:endParaRPr/>
           </a:p>
@@ -8651,7 +9008,7 @@
               </a:lnSpc>
               <a:buSzPct val="45000"/>
               <a:buFont typeface="StarSymbol"/>
-              <a:buChar char="l"/>
+              <a:buChar char=""/>
             </a:pPr>
             <a:r>
               <a:rPr lang="en-US" sz="2200" strike="noStrike">
@@ -8659,8 +9016,20 @@
                   <a:srgbClr val="595959"/>
                 </a:solidFill>
                 <a:latin typeface="News Gothic MT"/>
+                <a:ea typeface="DejaVu Sans"/>
               </a:rPr>
               <a:t>two complete loops</a:t>
+            </a:r>
+            <a:r>
+              <a:rPr lang="en-US" sz="2200" strike="noStrike">
+                <a:solidFill>
+                  <a:srgbClr val="595959"/>
+                </a:solidFill>
+                <a:latin typeface="News Gothic MT"/>
+                <a:ea typeface="DejaVu Sans"/>
+              </a:rPr>
+              <a:t>
+</a:t>
             </a:r>
             <a:endParaRPr/>
           </a:p>
@@ -8671,7 +9040,7 @@
               </a:lnSpc>
               <a:buSzPct val="45000"/>
               <a:buFont typeface="StarSymbol"/>
-              <a:buChar char="l"/>
+              <a:buChar char=""/>
             </a:pPr>
             <a:r>
               <a:rPr lang="en-US" sz="2200" strike="noStrike">
@@ -8679,8 +9048,20 @@
                   <a:srgbClr val="595959"/>
                 </a:solidFill>
                 <a:latin typeface="News Gothic MT"/>
-              </a:rPr>
-              <a:t>GPS data,mono images</a:t>
+                <a:ea typeface="DejaVu Sans"/>
+              </a:rPr>
+              <a:t>GPS data, mono images</a:t>
+            </a:r>
+            <a:r>
+              <a:rPr lang="en-US" sz="2200" strike="noStrike">
+                <a:solidFill>
+                  <a:srgbClr val="595959"/>
+                </a:solidFill>
+                <a:latin typeface="News Gothic MT"/>
+                <a:ea typeface="DejaVu Sans"/>
+              </a:rPr>
+              <a:t>
+</a:t>
             </a:r>
             <a:endParaRPr/>
           </a:p>
@@ -8691,7 +9072,7 @@
               </a:lnSpc>
               <a:buSzPct val="45000"/>
               <a:buFont typeface="StarSymbol"/>
-              <a:buChar char="l"/>
+              <a:buChar char=""/>
             </a:pPr>
             <a:r>
               <a:rPr lang="en-US" sz="2200" strike="noStrike">
@@ -8699,6 +9080,7 @@
                   <a:srgbClr val="595959"/>
                 </a:solidFill>
                 <a:latin typeface="News Gothic MT"/>
+                <a:ea typeface="DejaVu Sans"/>
               </a:rPr>
               <a:t>Greater challenge than </a:t>
             </a:r>
@@ -8711,7 +9093,7 @@
               </a:lnSpc>
               <a:buSzPct val="45000"/>
               <a:buFont typeface="StarSymbol"/>
-              <a:buChar char="l"/>
+              <a:buChar char=""/>
             </a:pPr>
             <a:r>
               <a:rPr lang="en-US" sz="2200" strike="noStrike">
@@ -8719,19 +9101,20 @@
                   <a:srgbClr val="595959"/>
                 </a:solidFill>
                 <a:latin typeface="News Gothic MT"/>
+                <a:ea typeface="DejaVu Sans"/>
               </a:rPr>
               <a:t>Malaga Urban Dataset</a:t>
             </a:r>
             <a:endParaRPr/>
           </a:p>
           <a:p>
-            <a:pPr lvl="1">
+            <a:pPr lvl="2">
               <a:lnSpc>
                 <a:spcPct val="100000"/>
               </a:lnSpc>
               <a:buSzPct val="45000"/>
               <a:buFont typeface="StarSymbol"/>
-              <a:buChar char="l"/>
+              <a:buChar char=""/>
             </a:pPr>
             <a:r>
               <a:rPr lang="en-US" sz="2200" strike="noStrike">
@@ -8739,19 +9122,20 @@
                   <a:srgbClr val="595959"/>
                 </a:solidFill>
                 <a:latin typeface="News Gothic MT"/>
+                <a:ea typeface="DejaVu Sans"/>
               </a:rPr>
               <a:t>People in images</a:t>
             </a:r>
             <a:endParaRPr/>
           </a:p>
           <a:p>
-            <a:pPr lvl="1">
+            <a:pPr lvl="2">
               <a:lnSpc>
                 <a:spcPct val="100000"/>
               </a:lnSpc>
               <a:buSzPct val="45000"/>
               <a:buFont typeface="StarSymbol"/>
-              <a:buChar char="l"/>
+              <a:buChar char=""/>
             </a:pPr>
             <a:r>
               <a:rPr lang="en-US" sz="2200" strike="noStrike">
@@ -8759,19 +9143,20 @@
                   <a:srgbClr val="595959"/>
                 </a:solidFill>
                 <a:latin typeface="News Gothic MT"/>
+                <a:ea typeface="DejaVu Sans"/>
               </a:rPr>
               <a:t>Walking, not driving </a:t>
             </a:r>
             <a:endParaRPr/>
           </a:p>
           <a:p>
-            <a:pPr lvl="1">
+            <a:pPr lvl="2">
               <a:lnSpc>
                 <a:spcPct val="100000"/>
               </a:lnSpc>
               <a:buSzPct val="45000"/>
               <a:buFont typeface="StarSymbol"/>
-              <a:buChar char="l"/>
+              <a:buChar char=""/>
             </a:pPr>
             <a:r>
               <a:rPr lang="en-US" sz="2200" strike="noStrike">
@@ -8779,6 +9164,7 @@
                   <a:srgbClr val="595959"/>
                 </a:solidFill>
                 <a:latin typeface="News Gothic MT"/>
+                <a:ea typeface="DejaVu Sans"/>
               </a:rPr>
               <a:t>Fewer images overall</a:t>
             </a:r>
@@ -8798,8 +9184,8 @@
         </p:blipFill>
         <p:spPr>
           <a:xfrm>
-            <a:off x="5273280" y="2080800"/>
-            <a:ext cx="4327560" cy="4722120"/>
+            <a:off x="4771440" y="1972800"/>
+            <a:ext cx="4541040" cy="4885200"/>
           </a:xfrm>
           <a:prstGeom prst="rect">
             <a:avLst/>
@@ -8871,7 +9257,7 @@
         <p:spPr>
           <a:xfrm>
             <a:off x="2194560" y="0"/>
-            <a:ext cx="5760360" cy="3809160"/>
+            <a:ext cx="5760000" cy="3808800"/>
           </a:xfrm>
           <a:prstGeom prst="rect">
             <a:avLst/>
@@ -8894,7 +9280,7 @@
         <p:spPr>
           <a:xfrm>
             <a:off x="2194560" y="3914280"/>
-            <a:ext cx="5760360" cy="3644640"/>
+            <a:ext cx="5760000" cy="3644280"/>
           </a:xfrm>
           <a:prstGeom prst="rect">
             <a:avLst/>
@@ -9090,7 +9476,7 @@
         <p:spPr>
           <a:xfrm>
             <a:off x="605520" y="118440"/>
-            <a:ext cx="8865360" cy="1473120"/>
+            <a:ext cx="8865000" cy="1472760"/>
           </a:xfrm>
           <a:prstGeom prst="rect">
             <a:avLst/>
@@ -9120,6 +9506,7 @@
                   <a:srgbClr val="2c7c9f"/>
                 </a:solidFill>
                 <a:latin typeface="News Gothic MT"/>
+                <a:ea typeface="DejaVu Sans"/>
               </a:rPr>
               <a:t>Method 1: Bag of Words</a:t>
             </a:r>
@@ -9136,7 +9523,7 @@
         <p:spPr>
           <a:xfrm>
             <a:off x="182880" y="2011680"/>
-            <a:ext cx="4205880" cy="3264840"/>
+            <a:ext cx="4205520" cy="3264480"/>
           </a:xfrm>
           <a:prstGeom prst="rect">
             <a:avLst/>
@@ -9169,8 +9556,20 @@
                   <a:srgbClr val="595959"/>
                 </a:solidFill>
                 <a:latin typeface="News Gothic MT"/>
+                <a:ea typeface="DejaVu Sans"/>
               </a:rPr>
               <a:t>Def: treat an image like a text document, break up into visual “words”</a:t>
+            </a:r>
+            <a:r>
+              <a:rPr lang="en-US" sz="2200" strike="noStrike">
+                <a:solidFill>
+                  <a:srgbClr val="595959"/>
+                </a:solidFill>
+                <a:latin typeface="News Gothic MT"/>
+                <a:ea typeface="DejaVu Sans"/>
+              </a:rPr>
+              <a:t>
+</a:t>
             </a:r>
             <a:endParaRPr/>
           </a:p>
@@ -9189,6 +9588,7 @@
                   <a:srgbClr val="595959"/>
                 </a:solidFill>
                 <a:latin typeface="News Gothic MT"/>
+                <a:ea typeface="DejaVu Sans"/>
               </a:rPr>
               <a:t>Detect and extract </a:t>
             </a:r>
@@ -9198,6 +9598,7 @@
                   <a:srgbClr val="595959"/>
                 </a:solidFill>
                 <a:latin typeface="News Gothic MT"/>
+                <a:ea typeface="DejaVu Sans"/>
               </a:rPr>
               <a:t>dense</a:t>
             </a:r>
@@ -9207,8 +9608,20 @@
                   <a:srgbClr val="595959"/>
                 </a:solidFill>
                 <a:latin typeface="News Gothic MT"/>
+                <a:ea typeface="DejaVu Sans"/>
               </a:rPr>
               <a:t> SIFT feature descriptors</a:t>
+            </a:r>
+            <a:r>
+              <a:rPr lang="en-US" sz="2200" strike="noStrike">
+                <a:solidFill>
+                  <a:srgbClr val="595959"/>
+                </a:solidFill>
+                <a:latin typeface="News Gothic MT"/>
+                <a:ea typeface="DejaVu Sans"/>
+              </a:rPr>
+              <a:t>
+</a:t>
             </a:r>
             <a:endParaRPr/>
           </a:p>
@@ -9227,8 +9640,20 @@
                   <a:srgbClr val="595959"/>
                 </a:solidFill>
                 <a:latin typeface="News Gothic MT"/>
+                <a:ea typeface="DejaVu Sans"/>
               </a:rPr>
               <a:t>Normalize feature descriptors</a:t>
+            </a:r>
+            <a:r>
+              <a:rPr lang="en-US" sz="2200" strike="noStrike">
+                <a:solidFill>
+                  <a:srgbClr val="595959"/>
+                </a:solidFill>
+                <a:latin typeface="News Gothic MT"/>
+                <a:ea typeface="DejaVu Sans"/>
+              </a:rPr>
+              <a:t>
+</a:t>
             </a:r>
             <a:endParaRPr/>
           </a:p>
@@ -9247,8 +9672,20 @@
                   <a:srgbClr val="595959"/>
                 </a:solidFill>
                 <a:latin typeface="News Gothic MT"/>
+                <a:ea typeface="DejaVu Sans"/>
               </a:rPr>
               <a:t>K-Means clustering to create pictorial codebook</a:t>
+            </a:r>
+            <a:r>
+              <a:rPr lang="en-US" sz="2200" strike="noStrike">
+                <a:solidFill>
+                  <a:srgbClr val="595959"/>
+                </a:solidFill>
+                <a:latin typeface="News Gothic MT"/>
+                <a:ea typeface="DejaVu Sans"/>
+              </a:rPr>
+              <a:t>
+</a:t>
             </a:r>
             <a:endParaRPr/>
           </a:p>
@@ -9267,6 +9704,7 @@
                   <a:srgbClr val="595959"/>
                 </a:solidFill>
                 <a:latin typeface="News Gothic MT"/>
+                <a:ea typeface="DejaVu Sans"/>
               </a:rPr>
               <a:t>Create histogram(s) of visual words</a:t>
             </a:r>
@@ -9287,7 +9725,7 @@
         <p:spPr>
           <a:xfrm>
             <a:off x="4754880" y="1828800"/>
-            <a:ext cx="4388760" cy="2925720"/>
+            <a:ext cx="4388400" cy="2925360"/>
           </a:xfrm>
           <a:prstGeom prst="rect">
             <a:avLst/>
@@ -9310,7 +9748,7 @@
         <p:spPr>
           <a:xfrm>
             <a:off x="5394960" y="4846320"/>
-            <a:ext cx="3108600" cy="2559960"/>
+            <a:ext cx="3108240" cy="2559600"/>
           </a:xfrm>
           <a:prstGeom prst="rect">
             <a:avLst/>
@@ -9378,7 +9816,7 @@
         <p:spPr>
           <a:xfrm>
             <a:off x="605520" y="118440"/>
-            <a:ext cx="8865360" cy="1473120"/>
+            <a:ext cx="8865000" cy="1472760"/>
           </a:xfrm>
           <a:prstGeom prst="rect">
             <a:avLst/>
@@ -9408,6 +9846,7 @@
                   <a:srgbClr val="2c7c9f"/>
                 </a:solidFill>
                 <a:latin typeface="News Gothic MT"/>
+                <a:ea typeface="DejaVu Sans"/>
               </a:rPr>
               <a:t>Bag of Words, continued</a:t>
             </a:r>
@@ -9424,7 +9863,7 @@
         <p:spPr>
           <a:xfrm>
             <a:off x="605520" y="1764000"/>
-            <a:ext cx="8865360" cy="4786920"/>
+            <a:ext cx="8865000" cy="4786560"/>
           </a:xfrm>
           <a:prstGeom prst="rect">
             <a:avLst/>
@@ -9457,6 +9896,7 @@
                   <a:srgbClr val="595959"/>
                 </a:solidFill>
                 <a:latin typeface="News Gothic MT"/>
+                <a:ea typeface="DejaVu Sans"/>
               </a:rPr>
               <a:t>Use One-Against-All SVM to classify</a:t>
             </a:r>
@@ -9477,7 +9917,7 @@
         <p:spPr>
           <a:xfrm>
             <a:off x="4722480" y="2651760"/>
-            <a:ext cx="4969800" cy="4023000"/>
+            <a:ext cx="4969440" cy="4022640"/>
           </a:xfrm>
           <a:prstGeom prst="rect">
             <a:avLst/>
@@ -9496,7 +9936,7 @@
         <p:spPr>
           <a:xfrm>
             <a:off x="1227600" y="6804360"/>
-            <a:ext cx="2468520" cy="601920"/>
+            <a:ext cx="2468160" cy="601560"/>
           </a:xfrm>
           <a:prstGeom prst="rect">
             <a:avLst/>
@@ -9517,7 +9957,11 @@
           <a:p>
             <a:r>
               <a:rPr lang="en-US" strike="noStrike">
+                <a:solidFill>
+                  <a:srgbClr val="000000"/>
+                </a:solidFill>
                 <a:latin typeface="Arial"/>
+                <a:ea typeface="DejaVu Sans"/>
               </a:rPr>
               <a:t>K-Nearest Neighbours</a:t>
             </a:r>
@@ -9531,7 +9975,11 @@
             </a:pPr>
             <a:r>
               <a:rPr lang="en-US" strike="noStrike">
+                <a:solidFill>
+                  <a:srgbClr val="000000"/>
+                </a:solidFill>
                 <a:latin typeface="Arial"/>
+                <a:ea typeface="DejaVu Sans"/>
               </a:rPr>
               <a:t>(Video Google)</a:t>
             </a:r>
@@ -9548,7 +9996,7 @@
         <p:spPr>
           <a:xfrm>
             <a:off x="6716880" y="6802560"/>
-            <a:ext cx="1081080" cy="601920"/>
+            <a:ext cx="1080720" cy="601560"/>
           </a:xfrm>
           <a:prstGeom prst="rect">
             <a:avLst/>
@@ -9569,7 +10017,11 @@
           <a:p>
             <a:r>
               <a:rPr lang="en-US" strike="noStrike">
+                <a:solidFill>
+                  <a:srgbClr val="000000"/>
+                </a:solidFill>
                 <a:latin typeface="Arial"/>
+                <a:ea typeface="DejaVu Sans"/>
               </a:rPr>
               <a:t>SVM</a:t>
             </a:r>
@@ -9583,7 +10035,11 @@
             </a:pPr>
             <a:r>
               <a:rPr lang="en-US" strike="noStrike">
+                <a:solidFill>
+                  <a:srgbClr val="000000"/>
+                </a:solidFill>
                 <a:latin typeface="Arial"/>
+                <a:ea typeface="DejaVu Sans"/>
               </a:rPr>
               <a:t>(Team 1)</a:t>
             </a:r>
@@ -9604,7 +10060,7 @@
         <p:spPr>
           <a:xfrm>
             <a:off x="480960" y="2651760"/>
-            <a:ext cx="3982680" cy="4023000"/>
+            <a:ext cx="3982320" cy="4022640"/>
           </a:xfrm>
           <a:prstGeom prst="rect">
             <a:avLst/>
@@ -9672,7 +10128,7 @@
         <p:spPr>
           <a:xfrm>
             <a:off x="605520" y="118440"/>
-            <a:ext cx="8865360" cy="1473120"/>
+            <a:ext cx="8865000" cy="1472760"/>
           </a:xfrm>
           <a:prstGeom prst="rect">
             <a:avLst/>
@@ -9702,6 +10158,7 @@
                   <a:srgbClr val="2c7c9f"/>
                 </a:solidFill>
                 <a:latin typeface="News Gothic MT"/>
+                <a:ea typeface="DejaVu Sans"/>
               </a:rPr>
               <a:t>Method 2: CNN feature extraction</a:t>
             </a:r>
@@ -9718,7 +10175,7 @@
         <p:spPr>
           <a:xfrm>
             <a:off x="497520" y="2016000"/>
-            <a:ext cx="4331880" cy="4786920"/>
+            <a:ext cx="4331520" cy="4786560"/>
           </a:xfrm>
           <a:prstGeom prst="rect">
             <a:avLst/>
@@ -9751,6 +10208,7 @@
                   <a:srgbClr val="595959"/>
                 </a:solidFill>
                 <a:latin typeface="News Gothic MT"/>
+                <a:ea typeface="DejaVu Sans"/>
               </a:rPr>
               <a:t>OverFeat</a:t>
             </a:r>
@@ -9771,6 +10229,18 @@
                   <a:srgbClr val="595959"/>
                 </a:solidFill>
                 <a:latin typeface="News Gothic MT"/>
+                <a:ea typeface="DejaVu Sans"/>
+              </a:rPr>
+              <a:t>
+</a:t>
+            </a:r>
+            <a:r>
+              <a:rPr lang="en-US" sz="2600" strike="noStrike">
+                <a:solidFill>
+                  <a:srgbClr val="595959"/>
+                </a:solidFill>
+                <a:latin typeface="News Gothic MT"/>
+                <a:ea typeface="DejaVu Sans"/>
               </a:rPr>
               <a:t>CNN = </a:t>
             </a:r>
@@ -9791,6 +10261,7 @@
                   <a:srgbClr val="595959"/>
                 </a:solidFill>
                 <a:latin typeface="News Gothic MT"/>
+                <a:ea typeface="DejaVu Sans"/>
               </a:rPr>
               <a:t>image classifier,</a:t>
             </a:r>
@@ -9811,6 +10282,7 @@
                   <a:srgbClr val="595959"/>
                 </a:solidFill>
                 <a:latin typeface="News Gothic MT"/>
+                <a:ea typeface="DejaVu Sans"/>
               </a:rPr>
               <a:t>feature extractor</a:t>
             </a:r>
@@ -9825,15 +10297,6 @@
               <a:buFont typeface="Arial"/>
               <a:buChar char="•"/>
             </a:pPr>
-            <a:r>
-              <a:rPr lang="en-US" sz="2600" strike="noStrike">
-                <a:solidFill>
-                  <a:srgbClr val="595959"/>
-                </a:solidFill>
-                <a:latin typeface="News Gothic MT"/>
-              </a:rPr>
-              <a:t>Trained with the</a:t>
-            </a:r>
             <a:endParaRPr/>
           </a:p>
           <a:p>
@@ -9851,8 +10314,9 @@
                   <a:srgbClr val="595959"/>
                 </a:solidFill>
                 <a:latin typeface="News Gothic MT"/>
-              </a:rPr>
-              <a:t>Torch7 package on</a:t>
+                <a:ea typeface="DejaVu Sans"/>
+              </a:rPr>
+              <a:t>Trained with the</a:t>
             </a:r>
             <a:endParaRPr/>
           </a:p>
@@ -9871,8 +10335,9 @@
                   <a:srgbClr val="595959"/>
                 </a:solidFill>
                 <a:latin typeface="News Gothic MT"/>
-              </a:rPr>
-              <a:t>the Imagenet </a:t>
+                <a:ea typeface="DejaVu Sans"/>
+              </a:rPr>
+              <a:t>Torch7 package on</a:t>
             </a:r>
             <a:endParaRPr/>
           </a:p>
@@ -9891,8 +10356,20 @@
                   <a:srgbClr val="595959"/>
                 </a:solidFill>
                 <a:latin typeface="News Gothic MT"/>
-              </a:rPr>
-              <a:t>dataset</a:t>
+                <a:ea typeface="DejaVu Sans"/>
+              </a:rPr>
+              <a:t>the Imagenet dataset</a:t>
+            </a:r>
+            <a:r>
+              <a:rPr lang="en-US" sz="2600" strike="noStrike">
+                <a:solidFill>
+                  <a:srgbClr val="595959"/>
+                </a:solidFill>
+                <a:latin typeface="News Gothic MT"/>
+                <a:ea typeface="DejaVu Sans"/>
+              </a:rPr>
+              <a:t>
+</a:t>
             </a:r>
             <a:endParaRPr/>
           </a:p>
@@ -9911,6 +10388,7 @@
                   <a:srgbClr val="595959"/>
                 </a:solidFill>
                 <a:latin typeface="News Gothic MT"/>
+                <a:ea typeface="DejaVu Sans"/>
               </a:rPr>
               <a:t>Linux only...</a:t>
             </a:r>
@@ -9939,7 +10417,7 @@
         <p:spPr>
           <a:xfrm>
             <a:off x="4278240" y="2233440"/>
-            <a:ext cx="5391720" cy="3958920"/>
+            <a:ext cx="5391360" cy="3958560"/>
           </a:xfrm>
           <a:prstGeom prst="rect">
             <a:avLst/>

</xml_diff>